<commit_message>
Reorder files after changing the git system.
</commit_message>
<xml_diff>
--- a/reports/Feb10/Reports.pptx
+++ b/reports/Feb10/Reports.pptx
@@ -5,7 +5,7 @@
     <p:sldMasterId id="2147483648" r:id="rId1"/>
   </p:sldMasterIdLst>
   <p:notesMasterIdLst>
-    <p:notesMasterId r:id="rId21"/>
+    <p:notesMasterId r:id="rId22"/>
   </p:notesMasterIdLst>
   <p:sldIdLst>
     <p:sldId id="256" r:id="rId2"/>
@@ -26,7 +26,8 @@
     <p:sldId id="276" r:id="rId17"/>
     <p:sldId id="289" r:id="rId18"/>
     <p:sldId id="291" r:id="rId19"/>
-    <p:sldId id="287" r:id="rId20"/>
+    <p:sldId id="292" r:id="rId20"/>
+    <p:sldId id="287" r:id="rId21"/>
   </p:sldIdLst>
   <p:sldSz cx="12192000" cy="6858000"/>
   <p:notesSz cx="6858000" cy="9144000"/>
@@ -215,7 +216,7 @@
           <a:p>
             <a:fld id="{E80C9750-F892-4DFE-91D8-54F3DE9823F6}" type="datetimeFigureOut">
               <a:rPr lang="en-US" smtClean="0"/>
-              <a:t>2/26/2018</a:t>
+              <a:t>2/28/2018</a:t>
             </a:fld>
             <a:endParaRPr lang="en-US"/>
           </a:p>
@@ -881,7 +882,7 @@
           <a:p>
             <a:fld id="{7E0162B6-BA86-45FA-A949-0E3FF5AE732F}" type="datetimeFigureOut">
               <a:rPr lang="en-US" smtClean="0"/>
-              <a:t>2/26/2018</a:t>
+              <a:t>2/28/2018</a:t>
             </a:fld>
             <a:endParaRPr lang="en-US"/>
           </a:p>
@@ -1079,7 +1080,7 @@
           <a:p>
             <a:fld id="{7E0162B6-BA86-45FA-A949-0E3FF5AE732F}" type="datetimeFigureOut">
               <a:rPr lang="en-US" smtClean="0"/>
-              <a:t>2/26/2018</a:t>
+              <a:t>2/28/2018</a:t>
             </a:fld>
             <a:endParaRPr lang="en-US"/>
           </a:p>
@@ -1287,7 +1288,7 @@
           <a:p>
             <a:fld id="{7E0162B6-BA86-45FA-A949-0E3FF5AE732F}" type="datetimeFigureOut">
               <a:rPr lang="en-US" smtClean="0"/>
-              <a:t>2/26/2018</a:t>
+              <a:t>2/28/2018</a:t>
             </a:fld>
             <a:endParaRPr lang="en-US"/>
           </a:p>
@@ -1485,7 +1486,7 @@
           <a:p>
             <a:fld id="{7E0162B6-BA86-45FA-A949-0E3FF5AE732F}" type="datetimeFigureOut">
               <a:rPr lang="en-US" smtClean="0"/>
-              <a:t>2/26/2018</a:t>
+              <a:t>2/28/2018</a:t>
             </a:fld>
             <a:endParaRPr lang="en-US"/>
           </a:p>
@@ -1760,7 +1761,7 @@
           <a:p>
             <a:fld id="{7E0162B6-BA86-45FA-A949-0E3FF5AE732F}" type="datetimeFigureOut">
               <a:rPr lang="en-US" smtClean="0"/>
-              <a:t>2/26/2018</a:t>
+              <a:t>2/28/2018</a:t>
             </a:fld>
             <a:endParaRPr lang="en-US"/>
           </a:p>
@@ -2025,7 +2026,7 @@
           <a:p>
             <a:fld id="{7E0162B6-BA86-45FA-A949-0E3FF5AE732F}" type="datetimeFigureOut">
               <a:rPr lang="en-US" smtClean="0"/>
-              <a:t>2/26/2018</a:t>
+              <a:t>2/28/2018</a:t>
             </a:fld>
             <a:endParaRPr lang="en-US"/>
           </a:p>
@@ -2437,7 +2438,7 @@
           <a:p>
             <a:fld id="{7E0162B6-BA86-45FA-A949-0E3FF5AE732F}" type="datetimeFigureOut">
               <a:rPr lang="en-US" smtClean="0"/>
-              <a:t>2/26/2018</a:t>
+              <a:t>2/28/2018</a:t>
             </a:fld>
             <a:endParaRPr lang="en-US"/>
           </a:p>
@@ -2578,7 +2579,7 @@
           <a:p>
             <a:fld id="{7E0162B6-BA86-45FA-A949-0E3FF5AE732F}" type="datetimeFigureOut">
               <a:rPr lang="en-US" smtClean="0"/>
-              <a:t>2/26/2018</a:t>
+              <a:t>2/28/2018</a:t>
             </a:fld>
             <a:endParaRPr lang="en-US"/>
           </a:p>
@@ -2691,7 +2692,7 @@
           <a:p>
             <a:fld id="{7E0162B6-BA86-45FA-A949-0E3FF5AE732F}" type="datetimeFigureOut">
               <a:rPr lang="en-US" smtClean="0"/>
-              <a:t>2/26/2018</a:t>
+              <a:t>2/28/2018</a:t>
             </a:fld>
             <a:endParaRPr lang="en-US"/>
           </a:p>
@@ -3002,7 +3003,7 @@
           <a:p>
             <a:fld id="{7E0162B6-BA86-45FA-A949-0E3FF5AE732F}" type="datetimeFigureOut">
               <a:rPr lang="en-US" smtClean="0"/>
-              <a:t>2/26/2018</a:t>
+              <a:t>2/28/2018</a:t>
             </a:fld>
             <a:endParaRPr lang="en-US"/>
           </a:p>
@@ -3290,7 +3291,7 @@
           <a:p>
             <a:fld id="{7E0162B6-BA86-45FA-A949-0E3FF5AE732F}" type="datetimeFigureOut">
               <a:rPr lang="en-US" smtClean="0"/>
-              <a:t>2/26/2018</a:t>
+              <a:t>2/28/2018</a:t>
             </a:fld>
             <a:endParaRPr lang="en-US"/>
           </a:p>
@@ -3531,7 +3532,7 @@
           <a:p>
             <a:fld id="{7E0162B6-BA86-45FA-A949-0E3FF5AE732F}" type="datetimeFigureOut">
               <a:rPr lang="en-US" smtClean="0"/>
-              <a:t>2/26/2018</a:t>
+              <a:t>2/28/2018</a:t>
             </a:fld>
             <a:endParaRPr lang="en-US"/>
           </a:p>
@@ -7547,8 +7548,8 @@
           </a:xfrm>
         </p:spPr>
       </p:pic>
-      <mc:AlternateContent xmlns:mc="http://schemas.openxmlformats.org/markup-compatibility/2006">
-        <mc:Choice xmlns:a14="http://schemas.microsoft.com/office/drawing/2010/main" Requires="a14">
+      <mc:AlternateContent xmlns:mc="http://schemas.openxmlformats.org/markup-compatibility/2006" xmlns:a14="http://schemas.microsoft.com/office/drawing/2010/main">
+        <mc:Choice Requires="a14">
           <p:sp>
             <p:nvSpPr>
               <p:cNvPr id="3" name="Rectangle 2">
@@ -7896,7 +7897,7 @@
             </p:txBody>
           </p:sp>
         </mc:Choice>
-        <mc:Fallback>
+        <mc:Fallback xmlns="">
           <p:sp>
             <p:nvSpPr>
               <p:cNvPr id="3" name="Rectangle 2">
@@ -7941,8 +7942,8 @@
           </p:sp>
         </mc:Fallback>
       </mc:AlternateContent>
-      <mc:AlternateContent xmlns:mc="http://schemas.openxmlformats.org/markup-compatibility/2006">
-        <mc:Choice xmlns:a14="http://schemas.microsoft.com/office/drawing/2010/main" Requires="a14">
+      <mc:AlternateContent xmlns:mc="http://schemas.openxmlformats.org/markup-compatibility/2006" xmlns:a14="http://schemas.microsoft.com/office/drawing/2010/main">
+        <mc:Choice Requires="a14">
           <p:sp>
             <p:nvSpPr>
               <p:cNvPr id="6" name="TextBox 5">
@@ -8099,7 +8100,7 @@
             </p:txBody>
           </p:sp>
         </mc:Choice>
-        <mc:Fallback>
+        <mc:Fallback xmlns="">
           <p:sp>
             <p:nvSpPr>
               <p:cNvPr id="6" name="TextBox 5">
@@ -8144,8 +8145,8 @@
           </p:sp>
         </mc:Fallback>
       </mc:AlternateContent>
-      <mc:AlternateContent xmlns:mc="http://schemas.openxmlformats.org/markup-compatibility/2006">
-        <mc:Choice xmlns:a14="http://schemas.microsoft.com/office/drawing/2010/main" Requires="a14">
+      <mc:AlternateContent xmlns:mc="http://schemas.openxmlformats.org/markup-compatibility/2006" xmlns:a14="http://schemas.microsoft.com/office/drawing/2010/main">
+        <mc:Choice Requires="a14">
           <p:sp>
             <p:nvSpPr>
               <p:cNvPr id="12" name="TextBox 11">
@@ -8540,7 +8541,7 @@
             </p:txBody>
           </p:sp>
         </mc:Choice>
-        <mc:Fallback>
+        <mc:Fallback xmlns="">
           <p:sp>
             <p:nvSpPr>
               <p:cNvPr id="12" name="TextBox 11">
@@ -8585,8 +8586,8 @@
           </p:sp>
         </mc:Fallback>
       </mc:AlternateContent>
-      <mc:AlternateContent xmlns:mc="http://schemas.openxmlformats.org/markup-compatibility/2006">
-        <mc:Choice xmlns:a14="http://schemas.microsoft.com/office/drawing/2010/main" Requires="a14">
+      <mc:AlternateContent xmlns:mc="http://schemas.openxmlformats.org/markup-compatibility/2006" xmlns:a14="http://schemas.microsoft.com/office/drawing/2010/main">
+        <mc:Choice Requires="a14">
           <p:sp>
             <p:nvSpPr>
               <p:cNvPr id="7" name="TextBox 6">
@@ -9262,7 +9263,7 @@
             </p:txBody>
           </p:sp>
         </mc:Choice>
-        <mc:Fallback>
+        <mc:Fallback xmlns="">
           <p:sp>
             <p:nvSpPr>
               <p:cNvPr id="7" name="TextBox 6">
@@ -11158,8 +11159,8 @@
           </a:p>
         </p:txBody>
       </p:sp>
-      <mc:AlternateContent xmlns:mc="http://schemas.openxmlformats.org/markup-compatibility/2006">
-        <mc:Choice xmlns:a14="http://schemas.microsoft.com/office/drawing/2010/main" Requires="a14">
+      <mc:AlternateContent xmlns:mc="http://schemas.openxmlformats.org/markup-compatibility/2006" xmlns:a14="http://schemas.microsoft.com/office/drawing/2010/main">
+        <mc:Choice Requires="a14">
           <p:sp>
             <p:nvSpPr>
               <p:cNvPr id="7" name="Rectangle 6">
@@ -11307,7 +11308,7 @@
             </p:txBody>
           </p:sp>
         </mc:Choice>
-        <mc:Fallback>
+        <mc:Fallback xmlns="">
           <p:sp>
             <p:nvSpPr>
               <p:cNvPr id="7" name="Rectangle 6">
@@ -11352,8 +11353,8 @@
           </p:sp>
         </mc:Fallback>
       </mc:AlternateContent>
-      <mc:AlternateContent xmlns:mc="http://schemas.openxmlformats.org/markup-compatibility/2006">
-        <mc:Choice xmlns:a14="http://schemas.microsoft.com/office/drawing/2010/main" Requires="a14">
+      <mc:AlternateContent xmlns:mc="http://schemas.openxmlformats.org/markup-compatibility/2006" xmlns:a14="http://schemas.microsoft.com/office/drawing/2010/main">
+        <mc:Choice Requires="a14">
           <p:sp>
             <p:nvSpPr>
               <p:cNvPr id="11" name="TextBox 10">
@@ -11454,7 +11455,7 @@
             </p:txBody>
           </p:sp>
         </mc:Choice>
-        <mc:Fallback>
+        <mc:Fallback xmlns="">
           <p:sp>
             <p:nvSpPr>
               <p:cNvPr id="11" name="TextBox 10">
@@ -11712,8 +11713,8 @@
           </p:sp>
         </mc:Fallback>
       </mc:AlternateContent>
-      <mc:AlternateContent xmlns:mc="http://schemas.openxmlformats.org/markup-compatibility/2006">
-        <mc:Choice xmlns:a14="http://schemas.microsoft.com/office/drawing/2010/main" Requires="a14">
+      <mc:AlternateContent xmlns:mc="http://schemas.openxmlformats.org/markup-compatibility/2006" xmlns:a14="http://schemas.microsoft.com/office/drawing/2010/main">
+        <mc:Choice Requires="a14">
           <p:sp>
             <p:nvSpPr>
               <p:cNvPr id="32" name="TextBox 31">
@@ -11753,14 +11754,7 @@
                         <a:latin typeface="Cambria Math" panose="02040503050406030204" pitchFamily="18" charset="0"/>
                         <a:ea typeface="Cambria Math" panose="02040503050406030204" pitchFamily="18" charset="0"/>
                       </a:rPr>
-                      <m:t>0&lt;</m:t>
-                    </m:r>
-                    <m:r>
-                      <a:rPr lang="en-US" b="0" i="0" smtClean="0">
-                        <a:latin typeface="Cambria Math" panose="02040503050406030204" pitchFamily="18" charset="0"/>
-                        <a:ea typeface="Cambria Math" panose="02040503050406030204" pitchFamily="18" charset="0"/>
-                      </a:rPr>
-                      <m:t>|</m:t>
+                      <m:t>0&lt;|</m:t>
                     </m:r>
                     <m:r>
                       <a:rPr lang="en-US" i="1" smtClean="0">
@@ -11807,7 +11801,7 @@
             </p:txBody>
           </p:sp>
         </mc:Choice>
-        <mc:Fallback>
+        <mc:Fallback xmlns="">
           <p:sp>
             <p:nvSpPr>
               <p:cNvPr id="32" name="TextBox 31">
@@ -11852,8 +11846,8 @@
           </p:sp>
         </mc:Fallback>
       </mc:AlternateContent>
-      <mc:AlternateContent xmlns:mc="http://schemas.openxmlformats.org/markup-compatibility/2006">
-        <mc:Choice xmlns:a14="http://schemas.microsoft.com/office/drawing/2010/main" Requires="a14">
+      <mc:AlternateContent xmlns:mc="http://schemas.openxmlformats.org/markup-compatibility/2006" xmlns:a14="http://schemas.microsoft.com/office/drawing/2010/main">
+        <mc:Choice Requires="a14">
           <p:sp>
             <p:nvSpPr>
               <p:cNvPr id="13" name="Rectangle 12">
@@ -12052,7 +12046,7 @@
             </p:txBody>
           </p:sp>
         </mc:Choice>
-        <mc:Fallback>
+        <mc:Fallback xmlns="">
           <p:sp>
             <p:nvSpPr>
               <p:cNvPr id="13" name="Rectangle 12">
@@ -12097,8 +12091,8 @@
           </p:sp>
         </mc:Fallback>
       </mc:AlternateContent>
-      <mc:AlternateContent xmlns:mc="http://schemas.openxmlformats.org/markup-compatibility/2006">
-        <mc:Choice xmlns:a14="http://schemas.microsoft.com/office/drawing/2010/main" Requires="a14">
+      <mc:AlternateContent xmlns:mc="http://schemas.openxmlformats.org/markup-compatibility/2006" xmlns:a14="http://schemas.microsoft.com/office/drawing/2010/main">
+        <mc:Choice Requires="a14">
           <p:sp>
             <p:nvSpPr>
               <p:cNvPr id="33" name="TextBox 32">
@@ -12380,7 +12374,7 @@
             </p:txBody>
           </p:sp>
         </mc:Choice>
-        <mc:Fallback>
+        <mc:Fallback xmlns="">
           <p:sp>
             <p:nvSpPr>
               <p:cNvPr id="33" name="TextBox 32">
@@ -12746,8 +12740,8 @@
           </p:sp>
         </mc:Fallback>
       </mc:AlternateContent>
-      <mc:AlternateContent xmlns:mc="http://schemas.openxmlformats.org/markup-compatibility/2006">
-        <mc:Choice xmlns:a14="http://schemas.microsoft.com/office/drawing/2010/main" Requires="a14">
+      <mc:AlternateContent xmlns:mc="http://schemas.openxmlformats.org/markup-compatibility/2006" xmlns:a14="http://schemas.microsoft.com/office/drawing/2010/main">
+        <mc:Choice Requires="a14">
           <p:sp>
             <p:nvSpPr>
               <p:cNvPr id="35" name="TextBox 34">
@@ -12787,14 +12781,7 @@
                         <a:latin typeface="Cambria Math" panose="02040503050406030204" pitchFamily="18" charset="0"/>
                         <a:ea typeface="Cambria Math" panose="02040503050406030204" pitchFamily="18" charset="0"/>
                       </a:rPr>
-                      <m:t>0&lt;</m:t>
-                    </m:r>
-                    <m:r>
-                      <a:rPr lang="en-US" b="0" i="0" smtClean="0">
-                        <a:latin typeface="Cambria Math" panose="02040503050406030204" pitchFamily="18" charset="0"/>
-                        <a:ea typeface="Cambria Math" panose="02040503050406030204" pitchFamily="18" charset="0"/>
-                      </a:rPr>
-                      <m:t>|</m:t>
+                      <m:t>0&lt;|</m:t>
                     </m:r>
                     <m:r>
                       <a:rPr lang="en-US" i="1" smtClean="0">
@@ -12841,7 +12828,7 @@
             </p:txBody>
           </p:sp>
         </mc:Choice>
-        <mc:Fallback>
+        <mc:Fallback xmlns="">
           <p:sp>
             <p:nvSpPr>
               <p:cNvPr id="35" name="TextBox 34">
@@ -12886,8 +12873,8 @@
           </p:sp>
         </mc:Fallback>
       </mc:AlternateContent>
-      <mc:AlternateContent xmlns:mc="http://schemas.openxmlformats.org/markup-compatibility/2006">
-        <mc:Choice xmlns:a14="http://schemas.microsoft.com/office/drawing/2010/main" Requires="a14">
+      <mc:AlternateContent xmlns:mc="http://schemas.openxmlformats.org/markup-compatibility/2006" xmlns:a14="http://schemas.microsoft.com/office/drawing/2010/main">
+        <mc:Choice Requires="a14">
           <p:sp>
             <p:nvSpPr>
               <p:cNvPr id="37" name="TextBox 36">
@@ -13182,7 +13169,7 @@
             </p:txBody>
           </p:sp>
         </mc:Choice>
-        <mc:Fallback>
+        <mc:Fallback xmlns="">
           <p:sp>
             <p:nvSpPr>
               <p:cNvPr id="37" name="TextBox 36">
@@ -13232,8 +13219,8 @@
           </p:sp>
         </mc:Fallback>
       </mc:AlternateContent>
-      <mc:AlternateContent xmlns:mc="http://schemas.openxmlformats.org/markup-compatibility/2006">
-        <mc:Choice xmlns:a14="http://schemas.microsoft.com/office/drawing/2010/main" Requires="a14">
+      <mc:AlternateContent xmlns:mc="http://schemas.openxmlformats.org/markup-compatibility/2006" xmlns:a14="http://schemas.microsoft.com/office/drawing/2010/main">
+        <mc:Choice Requires="a14">
           <p:sp>
             <p:nvSpPr>
               <p:cNvPr id="38" name="TextBox 37">
@@ -13624,7 +13611,7 @@
             </p:txBody>
           </p:sp>
         </mc:Choice>
-        <mc:Fallback>
+        <mc:Fallback xmlns="">
           <p:sp>
             <p:nvSpPr>
               <p:cNvPr id="38" name="TextBox 37">
@@ -13669,8 +13656,8 @@
           </p:sp>
         </mc:Fallback>
       </mc:AlternateContent>
-      <mc:AlternateContent xmlns:mc="http://schemas.openxmlformats.org/markup-compatibility/2006">
-        <mc:Choice xmlns:a14="http://schemas.microsoft.com/office/drawing/2010/main" Requires="a14">
+      <mc:AlternateContent xmlns:mc="http://schemas.openxmlformats.org/markup-compatibility/2006" xmlns:a14="http://schemas.microsoft.com/office/drawing/2010/main">
+        <mc:Choice Requires="a14">
           <p:sp>
             <p:nvSpPr>
               <p:cNvPr id="39" name="Rectangle 38">
@@ -13882,7 +13869,7 @@
             </p:txBody>
           </p:sp>
         </mc:Choice>
-        <mc:Fallback>
+        <mc:Fallback xmlns="">
           <p:sp>
             <p:nvSpPr>
               <p:cNvPr id="39" name="Rectangle 38">
@@ -13927,8 +13914,8 @@
           </p:sp>
         </mc:Fallback>
       </mc:AlternateContent>
-      <mc:AlternateContent xmlns:mc="http://schemas.openxmlformats.org/markup-compatibility/2006">
-        <mc:Choice xmlns:a14="http://schemas.microsoft.com/office/drawing/2010/main" Requires="a14">
+      <mc:AlternateContent xmlns:mc="http://schemas.openxmlformats.org/markup-compatibility/2006" xmlns:a14="http://schemas.microsoft.com/office/drawing/2010/main">
+        <mc:Choice Requires="a14">
           <p:sp>
             <p:nvSpPr>
               <p:cNvPr id="36" name="TextBox 35">
@@ -14087,7 +14074,7 @@
             </p:txBody>
           </p:sp>
         </mc:Choice>
-        <mc:Fallback>
+        <mc:Fallback xmlns="">
           <p:sp>
             <p:nvSpPr>
               <p:cNvPr id="36" name="TextBox 35">
@@ -14167,8 +14154,8 @@
           <a:chExt cx="0" cy="0"/>
         </a:xfrm>
       </p:grpSpPr>
-      <mc:AlternateContent xmlns:mc="http://schemas.openxmlformats.org/markup-compatibility/2006">
-        <mc:Choice xmlns:a14="http://schemas.microsoft.com/office/drawing/2010/main" Requires="a14">
+      <mc:AlternateContent xmlns:mc="http://schemas.openxmlformats.org/markup-compatibility/2006" xmlns:a14="http://schemas.microsoft.com/office/drawing/2010/main">
+        <mc:Choice Requires="a14">
           <p:sp>
             <p:nvSpPr>
               <p:cNvPr id="4" name="TextBox 3">
@@ -14237,7 +14224,7 @@
             </p:txBody>
           </p:sp>
         </mc:Choice>
-        <mc:Fallback>
+        <mc:Fallback xmlns="">
           <p:sp>
             <p:nvSpPr>
               <p:cNvPr id="4" name="TextBox 3">
@@ -14282,8 +14269,8 @@
           </p:sp>
         </mc:Fallback>
       </mc:AlternateContent>
-      <mc:AlternateContent xmlns:mc="http://schemas.openxmlformats.org/markup-compatibility/2006">
-        <mc:Choice xmlns:a14="http://schemas.microsoft.com/office/drawing/2010/main" Requires="a14">
+      <mc:AlternateContent xmlns:mc="http://schemas.openxmlformats.org/markup-compatibility/2006" xmlns:a14="http://schemas.microsoft.com/office/drawing/2010/main">
+        <mc:Choice Requires="a14">
           <p:sp>
             <p:nvSpPr>
               <p:cNvPr id="5" name="TextBox 4">
@@ -14358,7 +14345,7 @@
             </p:txBody>
           </p:sp>
         </mc:Choice>
-        <mc:Fallback>
+        <mc:Fallback xmlns="">
           <p:sp>
             <p:nvSpPr>
               <p:cNvPr id="5" name="TextBox 4">
@@ -14403,8 +14390,8 @@
           </p:sp>
         </mc:Fallback>
       </mc:AlternateContent>
-      <mc:AlternateContent xmlns:mc="http://schemas.openxmlformats.org/markup-compatibility/2006">
-        <mc:Choice xmlns:a14="http://schemas.microsoft.com/office/drawing/2010/main" Requires="a14">
+      <mc:AlternateContent xmlns:mc="http://schemas.openxmlformats.org/markup-compatibility/2006" xmlns:a14="http://schemas.microsoft.com/office/drawing/2010/main">
+        <mc:Choice Requires="a14">
           <p:sp>
             <p:nvSpPr>
               <p:cNvPr id="6" name="TextBox 5">
@@ -14479,7 +14466,7 @@
             </p:txBody>
           </p:sp>
         </mc:Choice>
-        <mc:Fallback>
+        <mc:Fallback xmlns="">
           <p:sp>
             <p:nvSpPr>
               <p:cNvPr id="6" name="TextBox 5">
@@ -14524,8 +14511,8 @@
           </p:sp>
         </mc:Fallback>
       </mc:AlternateContent>
-      <mc:AlternateContent xmlns:mc="http://schemas.openxmlformats.org/markup-compatibility/2006">
-        <mc:Choice xmlns:a14="http://schemas.microsoft.com/office/drawing/2010/main" Requires="a14">
+      <mc:AlternateContent xmlns:mc="http://schemas.openxmlformats.org/markup-compatibility/2006" xmlns:a14="http://schemas.microsoft.com/office/drawing/2010/main">
+        <mc:Choice Requires="a14">
           <p:sp>
             <p:nvSpPr>
               <p:cNvPr id="8" name="TextBox 7">
@@ -14594,7 +14581,7 @@
             </p:txBody>
           </p:sp>
         </mc:Choice>
-        <mc:Fallback>
+        <mc:Fallback xmlns="">
           <p:sp>
             <p:nvSpPr>
               <p:cNvPr id="8" name="TextBox 7">
@@ -14639,8 +14626,8 @@
           </p:sp>
         </mc:Fallback>
       </mc:AlternateContent>
-      <mc:AlternateContent xmlns:mc="http://schemas.openxmlformats.org/markup-compatibility/2006">
-        <mc:Choice xmlns:a14="http://schemas.microsoft.com/office/drawing/2010/main" Requires="a14">
+      <mc:AlternateContent xmlns:mc="http://schemas.openxmlformats.org/markup-compatibility/2006" xmlns:a14="http://schemas.microsoft.com/office/drawing/2010/main">
+        <mc:Choice Requires="a14">
           <p:sp>
             <p:nvSpPr>
               <p:cNvPr id="9" name="TextBox 8">
@@ -14715,7 +14702,7 @@
             </p:txBody>
           </p:sp>
         </mc:Choice>
-        <mc:Fallback>
+        <mc:Fallback xmlns="">
           <p:sp>
             <p:nvSpPr>
               <p:cNvPr id="9" name="TextBox 8">
@@ -14760,8 +14747,8 @@
           </p:sp>
         </mc:Fallback>
       </mc:AlternateContent>
-      <mc:AlternateContent xmlns:mc="http://schemas.openxmlformats.org/markup-compatibility/2006">
-        <mc:Choice xmlns:a14="http://schemas.microsoft.com/office/drawing/2010/main" Requires="a14">
+      <mc:AlternateContent xmlns:mc="http://schemas.openxmlformats.org/markup-compatibility/2006" xmlns:a14="http://schemas.microsoft.com/office/drawing/2010/main">
+        <mc:Choice Requires="a14">
           <p:sp>
             <p:nvSpPr>
               <p:cNvPr id="10" name="TextBox 9">
@@ -14836,7 +14823,7 @@
             </p:txBody>
           </p:sp>
         </mc:Choice>
-        <mc:Fallback>
+        <mc:Fallback xmlns="">
           <p:sp>
             <p:nvSpPr>
               <p:cNvPr id="10" name="TextBox 9">
@@ -15133,8 +15120,8 @@
           </a:fontRef>
         </p:style>
       </p:cxnSp>
-      <mc:AlternateContent xmlns:mc="http://schemas.openxmlformats.org/markup-compatibility/2006">
-        <mc:Choice xmlns:a14="http://schemas.microsoft.com/office/drawing/2010/main" Requires="a14">
+      <mc:AlternateContent xmlns:mc="http://schemas.openxmlformats.org/markup-compatibility/2006" xmlns:a14="http://schemas.microsoft.com/office/drawing/2010/main">
+        <mc:Choice Requires="a14">
           <p:sp>
             <p:nvSpPr>
               <p:cNvPr id="23" name="TextBox 22">
@@ -15185,7 +15172,7 @@
             </p:txBody>
           </p:sp>
         </mc:Choice>
-        <mc:Fallback>
+        <mc:Fallback xmlns="">
           <p:sp>
             <p:nvSpPr>
               <p:cNvPr id="23" name="TextBox 22">
@@ -15230,8 +15217,8 @@
           </p:sp>
         </mc:Fallback>
       </mc:AlternateContent>
-      <mc:AlternateContent xmlns:mc="http://schemas.openxmlformats.org/markup-compatibility/2006">
-        <mc:Choice xmlns:a14="http://schemas.microsoft.com/office/drawing/2010/main" Requires="a14">
+      <mc:AlternateContent xmlns:mc="http://schemas.openxmlformats.org/markup-compatibility/2006" xmlns:a14="http://schemas.microsoft.com/office/drawing/2010/main">
+        <mc:Choice Requires="a14">
           <p:sp>
             <p:nvSpPr>
               <p:cNvPr id="24" name="TextBox 23">
@@ -15282,7 +15269,7 @@
             </p:txBody>
           </p:sp>
         </mc:Choice>
-        <mc:Fallback>
+        <mc:Fallback xmlns="">
           <p:sp>
             <p:nvSpPr>
               <p:cNvPr id="24" name="TextBox 23">
@@ -15327,8 +15314,8 @@
           </p:sp>
         </mc:Fallback>
       </mc:AlternateContent>
-      <mc:AlternateContent xmlns:mc="http://schemas.openxmlformats.org/markup-compatibility/2006">
-        <mc:Choice xmlns:a14="http://schemas.microsoft.com/office/drawing/2010/main" Requires="a14">
+      <mc:AlternateContent xmlns:mc="http://schemas.openxmlformats.org/markup-compatibility/2006" xmlns:a14="http://schemas.microsoft.com/office/drawing/2010/main">
+        <mc:Choice Requires="a14">
           <p:sp>
             <p:nvSpPr>
               <p:cNvPr id="25" name="TextBox 24">
@@ -15379,7 +15366,7 @@
             </p:txBody>
           </p:sp>
         </mc:Choice>
-        <mc:Fallback>
+        <mc:Fallback xmlns="">
           <p:sp>
             <p:nvSpPr>
               <p:cNvPr id="25" name="TextBox 24">
@@ -15424,8 +15411,8 @@
           </p:sp>
         </mc:Fallback>
       </mc:AlternateContent>
-      <mc:AlternateContent xmlns:mc="http://schemas.openxmlformats.org/markup-compatibility/2006">
-        <mc:Choice xmlns:a14="http://schemas.microsoft.com/office/drawing/2010/main" Requires="a14">
+      <mc:AlternateContent xmlns:mc="http://schemas.openxmlformats.org/markup-compatibility/2006" xmlns:a14="http://schemas.microsoft.com/office/drawing/2010/main">
+        <mc:Choice Requires="a14">
           <p:sp>
             <p:nvSpPr>
               <p:cNvPr id="26" name="TextBox 25">
@@ -15476,7 +15463,7 @@
             </p:txBody>
           </p:sp>
         </mc:Choice>
-        <mc:Fallback>
+        <mc:Fallback xmlns="">
           <p:sp>
             <p:nvSpPr>
               <p:cNvPr id="26" name="TextBox 25">
@@ -15521,8 +15508,8 @@
           </p:sp>
         </mc:Fallback>
       </mc:AlternateContent>
-      <mc:AlternateContent xmlns:mc="http://schemas.openxmlformats.org/markup-compatibility/2006">
-        <mc:Choice xmlns:a14="http://schemas.microsoft.com/office/drawing/2010/main" Requires="a14">
+      <mc:AlternateContent xmlns:mc="http://schemas.openxmlformats.org/markup-compatibility/2006" xmlns:a14="http://schemas.microsoft.com/office/drawing/2010/main">
+        <mc:Choice Requires="a14">
           <p:sp>
             <p:nvSpPr>
               <p:cNvPr id="27" name="TextBox 26">
@@ -15573,7 +15560,7 @@
             </p:txBody>
           </p:sp>
         </mc:Choice>
-        <mc:Fallback>
+        <mc:Fallback xmlns="">
           <p:sp>
             <p:nvSpPr>
               <p:cNvPr id="27" name="TextBox 26">
@@ -15618,8 +15605,8 @@
           </p:sp>
         </mc:Fallback>
       </mc:AlternateContent>
-      <mc:AlternateContent xmlns:mc="http://schemas.openxmlformats.org/markup-compatibility/2006">
-        <mc:Choice xmlns:a14="http://schemas.microsoft.com/office/drawing/2010/main" Requires="a14">
+      <mc:AlternateContent xmlns:mc="http://schemas.openxmlformats.org/markup-compatibility/2006" xmlns:a14="http://schemas.microsoft.com/office/drawing/2010/main">
+        <mc:Choice Requires="a14">
           <p:sp>
             <p:nvSpPr>
               <p:cNvPr id="28" name="TextBox 27">
@@ -15670,7 +15657,7 @@
             </p:txBody>
           </p:sp>
         </mc:Choice>
-        <mc:Fallback>
+        <mc:Fallback xmlns="">
           <p:sp>
             <p:nvSpPr>
               <p:cNvPr id="28" name="TextBox 27">
@@ -15769,8 +15756,8 @@
           </a:p>
         </p:txBody>
       </p:sp>
-      <mc:AlternateContent xmlns:mc="http://schemas.openxmlformats.org/markup-compatibility/2006">
-        <mc:Choice xmlns:a14="http://schemas.microsoft.com/office/drawing/2010/main" Requires="a14">
+      <mc:AlternateContent xmlns:mc="http://schemas.openxmlformats.org/markup-compatibility/2006" xmlns:a14="http://schemas.microsoft.com/office/drawing/2010/main">
+        <mc:Choice Requires="a14">
           <p:sp>
             <p:nvSpPr>
               <p:cNvPr id="35" name="TextBox 34">
@@ -15877,7 +15864,7 @@
             </p:txBody>
           </p:sp>
         </mc:Choice>
-        <mc:Fallback>
+        <mc:Fallback xmlns="">
           <p:sp>
             <p:nvSpPr>
               <p:cNvPr id="35" name="TextBox 34">
@@ -15922,8 +15909,8 @@
           </p:sp>
         </mc:Fallback>
       </mc:AlternateContent>
-      <mc:AlternateContent xmlns:mc="http://schemas.openxmlformats.org/markup-compatibility/2006">
-        <mc:Choice xmlns:a14="http://schemas.microsoft.com/office/drawing/2010/main" Requires="a14">
+      <mc:AlternateContent xmlns:mc="http://schemas.openxmlformats.org/markup-compatibility/2006" xmlns:a14="http://schemas.microsoft.com/office/drawing/2010/main">
+        <mc:Choice Requires="a14">
           <p:sp>
             <p:nvSpPr>
               <p:cNvPr id="38" name="TextBox 37">
@@ -16539,7 +16526,7 @@
             </p:txBody>
           </p:sp>
         </mc:Choice>
-        <mc:Fallback>
+        <mc:Fallback xmlns="">
           <p:sp>
             <p:nvSpPr>
               <p:cNvPr id="38" name="TextBox 37">
@@ -16584,8 +16571,8 @@
           </p:sp>
         </mc:Fallback>
       </mc:AlternateContent>
-      <mc:AlternateContent xmlns:mc="http://schemas.openxmlformats.org/markup-compatibility/2006">
-        <mc:Choice xmlns:a14="http://schemas.microsoft.com/office/drawing/2010/main" Requires="a14">
+      <mc:AlternateContent xmlns:mc="http://schemas.openxmlformats.org/markup-compatibility/2006" xmlns:a14="http://schemas.microsoft.com/office/drawing/2010/main">
+        <mc:Choice Requires="a14">
           <p:sp>
             <p:nvSpPr>
               <p:cNvPr id="36" name="TextBox 35">
@@ -17501,7 +17488,7 @@
             </p:txBody>
           </p:sp>
         </mc:Choice>
-        <mc:Fallback>
+        <mc:Fallback xmlns="">
           <p:sp>
             <p:nvSpPr>
               <p:cNvPr id="36" name="TextBox 35">
@@ -17551,8 +17538,8 @@
           </p:sp>
         </mc:Fallback>
       </mc:AlternateContent>
-      <mc:AlternateContent xmlns:mc="http://schemas.openxmlformats.org/markup-compatibility/2006">
-        <mc:Choice xmlns:a14="http://schemas.microsoft.com/office/drawing/2010/main" Requires="a14">
+      <mc:AlternateContent xmlns:mc="http://schemas.openxmlformats.org/markup-compatibility/2006" xmlns:a14="http://schemas.microsoft.com/office/drawing/2010/main">
+        <mc:Choice Requires="a14">
           <p:sp>
             <p:nvSpPr>
               <p:cNvPr id="30" name="TextBox 29">
@@ -17711,7 +17698,7 @@
             </p:txBody>
           </p:sp>
         </mc:Choice>
-        <mc:Fallback>
+        <mc:Fallback xmlns="">
           <p:sp>
             <p:nvSpPr>
               <p:cNvPr id="30" name="TextBox 29">
@@ -19413,7 +19400,7 @@
 </file>
 
 <file path=ppt/slides/slide17.xml><?xml version="1.0" encoding="utf-8"?>
-<p:sld xmlns:a="http://schemas.openxmlformats.org/drawingml/2006/main" xmlns:r="http://schemas.openxmlformats.org/officeDocument/2006/relationships" xmlns:p="http://schemas.openxmlformats.org/presentationml/2006/main">
+<p:sld xmlns:a="http://schemas.openxmlformats.org/drawingml/2006/main" xmlns:r="http://schemas.openxmlformats.org/officeDocument/2006/relationships" xmlns:p="http://schemas.openxmlformats.org/presentationml/2006/main" show="0">
   <p:cSld>
     <p:spTree>
       <p:nvGrpSpPr>
@@ -19774,7 +19761,7 @@
         <p:spPr>
           <a:xfrm>
             <a:off x="0" y="0"/>
-            <a:ext cx="3840000" cy="2880000"/>
+            <a:ext cx="3840000" cy="2879999"/>
           </a:xfrm>
           <a:prstGeom prst="rect">
             <a:avLst/>
@@ -19810,7 +19797,7 @@
         <p:spPr>
           <a:xfrm>
             <a:off x="4175999" y="0"/>
-            <a:ext cx="3840000" cy="2880000"/>
+            <a:ext cx="3840000" cy="2879999"/>
           </a:xfrm>
           <a:prstGeom prst="rect">
             <a:avLst/>
@@ -19846,7 +19833,7 @@
         <p:spPr>
           <a:xfrm>
             <a:off x="8352000" y="0"/>
-            <a:ext cx="3840000" cy="2880000"/>
+            <a:ext cx="3840000" cy="2879999"/>
           </a:xfrm>
           <a:prstGeom prst="rect">
             <a:avLst/>
@@ -19961,8 +19948,8 @@
           </a:p>
         </p:txBody>
       </p:sp>
-      <mc:AlternateContent xmlns:mc="http://schemas.openxmlformats.org/markup-compatibility/2006">
-        <mc:Choice xmlns:a14="http://schemas.microsoft.com/office/drawing/2010/main" Requires="a14">
+      <mc:AlternateContent xmlns:mc="http://schemas.openxmlformats.org/markup-compatibility/2006" xmlns:a14="http://schemas.microsoft.com/office/drawing/2010/main">
+        <mc:Choice Requires="a14">
           <p:sp>
             <p:nvSpPr>
               <p:cNvPr id="11" name="TextBox 10">
@@ -19991,6 +19978,7 @@
               </a:bodyPr>
               <a:lstStyle/>
               <a:p>
+                <a:pPr/>
                 <a14:m>
                   <m:oMathPara xmlns:m="http://schemas.openxmlformats.org/officeDocument/2006/math">
                     <m:oMathParaPr>
@@ -20061,7 +20049,7 @@
             </p:txBody>
           </p:sp>
         </mc:Choice>
-        <mc:Fallback>
+        <mc:Fallback xmlns="">
           <p:sp>
             <p:nvSpPr>
               <p:cNvPr id="11" name="TextBox 10">
@@ -20135,7 +20123,7 @@
         <p:spPr>
           <a:xfrm>
             <a:off x="8351998" y="3971800"/>
-            <a:ext cx="3840000" cy="2880000"/>
+            <a:ext cx="3840000" cy="2879999"/>
           </a:xfrm>
           <a:prstGeom prst="rect">
             <a:avLst/>
@@ -20171,7 +20159,7 @@
         <p:spPr>
           <a:xfrm>
             <a:off x="0" y="3971800"/>
-            <a:ext cx="3840000" cy="2880000"/>
+            <a:ext cx="3840000" cy="2879999"/>
           </a:xfrm>
           <a:prstGeom prst="rect">
             <a:avLst/>
@@ -20207,7 +20195,7 @@
         <p:spPr>
           <a:xfrm>
             <a:off x="4175999" y="3971800"/>
-            <a:ext cx="3840000" cy="2880000"/>
+            <a:ext cx="3840000" cy="2879999"/>
           </a:xfrm>
           <a:prstGeom prst="rect">
             <a:avLst/>
@@ -20335,7 +20323,7 @@
 </file>
 
 <file path=ppt/slides/slide19.xml><?xml version="1.0" encoding="utf-8"?>
-<p:sld xmlns:a="http://schemas.openxmlformats.org/drawingml/2006/main" xmlns:r="http://schemas.openxmlformats.org/officeDocument/2006/relationships" xmlns:p="http://schemas.openxmlformats.org/presentationml/2006/main" show="0">
+<p:sld xmlns:a="http://schemas.openxmlformats.org/drawingml/2006/main" xmlns:r="http://schemas.openxmlformats.org/officeDocument/2006/relationships" xmlns:p="http://schemas.openxmlformats.org/presentationml/2006/main">
   <p:cSld>
     <p:spTree>
       <p:nvGrpSpPr>
@@ -20353,11 +20341,46 @@
       </p:grpSpPr>
       <p:pic>
         <p:nvPicPr>
-          <p:cNvPr id="4" name="Picture 3">
-            <a:hlinkClick r:id="rId2" action="ppaction://hlinksldjump"/>
+          <p:cNvPr id="3" name="Picture 2">
             <a:extLst>
               <a:ext uri="{FF2B5EF4-FFF2-40B4-BE49-F238E27FC236}">
-                <a16:creationId xmlns:a16="http://schemas.microsoft.com/office/drawing/2014/main" id="{EDF5E059-7578-480C-939A-57A363442EE9}"/>
+                <a16:creationId xmlns:a16="http://schemas.microsoft.com/office/drawing/2014/main" id="{42A7FFC5-D950-4189-B69E-1A562AA920EB}"/>
+              </a:ext>
+            </a:extLst>
+          </p:cNvPr>
+          <p:cNvPicPr>
+            <a:picLocks noChangeAspect="1"/>
+          </p:cNvPicPr>
+          <p:nvPr/>
+        </p:nvPicPr>
+        <p:blipFill>
+          <a:blip r:embed="rId2">
+            <a:extLst>
+              <a:ext uri="{28A0092B-C50C-407E-A947-70E740481C1C}">
+                <a14:useLocalDpi xmlns:a14="http://schemas.microsoft.com/office/drawing/2010/main" val="0"/>
+              </a:ext>
+            </a:extLst>
+          </a:blip>
+          <a:stretch>
+            <a:fillRect/>
+          </a:stretch>
+        </p:blipFill>
+        <p:spPr>
+          <a:xfrm>
+            <a:off x="592875" y="103756"/>
+            <a:ext cx="3600001" cy="2700000"/>
+          </a:xfrm>
+          <a:prstGeom prst="rect">
+            <a:avLst/>
+          </a:prstGeom>
+        </p:spPr>
+      </p:pic>
+      <p:pic>
+        <p:nvPicPr>
+          <p:cNvPr id="5" name="Picture 4">
+            <a:extLst>
+              <a:ext uri="{FF2B5EF4-FFF2-40B4-BE49-F238E27FC236}">
+                <a16:creationId xmlns:a16="http://schemas.microsoft.com/office/drawing/2014/main" id="{4F14BBE7-3F6B-492B-8CC1-CB01090FBD09}"/>
               </a:ext>
             </a:extLst>
           </p:cNvPr>
@@ -20380,8 +20403,8 @@
         </p:blipFill>
         <p:spPr>
           <a:xfrm>
-            <a:off x="527043" y="1340641"/>
-            <a:ext cx="5568957" cy="4176718"/>
+            <a:off x="4359806" y="103756"/>
+            <a:ext cx="3600001" cy="2700000"/>
           </a:xfrm>
           <a:prstGeom prst="rect">
             <a:avLst/>
@@ -20390,11 +20413,10 @@
       </p:pic>
       <p:pic>
         <p:nvPicPr>
-          <p:cNvPr id="6" name="Picture 5">
-            <a:hlinkClick r:id="rId2" action="ppaction://hlinksldjump"/>
+          <p:cNvPr id="7" name="Picture 6">
             <a:extLst>
               <a:ext uri="{FF2B5EF4-FFF2-40B4-BE49-F238E27FC236}">
-                <a16:creationId xmlns:a16="http://schemas.microsoft.com/office/drawing/2014/main" id="{48C9FC82-070C-477E-B4CD-74E3064ACB75}"/>
+                <a16:creationId xmlns:a16="http://schemas.microsoft.com/office/drawing/2014/main" id="{5CF2BC20-E993-462E-BACD-CEF4DB509C1F}"/>
               </a:ext>
             </a:extLst>
           </p:cNvPr>
@@ -20417,8 +20439,116 @@
         </p:blipFill>
         <p:spPr>
           <a:xfrm>
-            <a:off x="6096000" y="1340641"/>
-            <a:ext cx="5568957" cy="4176718"/>
+            <a:off x="8126736" y="103756"/>
+            <a:ext cx="3600001" cy="2700000"/>
+          </a:xfrm>
+          <a:prstGeom prst="rect">
+            <a:avLst/>
+          </a:prstGeom>
+        </p:spPr>
+      </p:pic>
+      <p:pic>
+        <p:nvPicPr>
+          <p:cNvPr id="15" name="Picture 14">
+            <a:extLst>
+              <a:ext uri="{FF2B5EF4-FFF2-40B4-BE49-F238E27FC236}">
+                <a16:creationId xmlns:a16="http://schemas.microsoft.com/office/drawing/2014/main" id="{D7143DF8-13B3-41C4-8811-C7E885E74D16}"/>
+              </a:ext>
+            </a:extLst>
+          </p:cNvPr>
+          <p:cNvPicPr>
+            <a:picLocks noChangeAspect="1"/>
+          </p:cNvPicPr>
+          <p:nvPr/>
+        </p:nvPicPr>
+        <p:blipFill>
+          <a:blip r:embed="rId5">
+            <a:extLst>
+              <a:ext uri="{28A0092B-C50C-407E-A947-70E740481C1C}">
+                <a14:useLocalDpi xmlns:a14="http://schemas.microsoft.com/office/drawing/2010/main" val="0"/>
+              </a:ext>
+            </a:extLst>
+          </a:blip>
+          <a:stretch>
+            <a:fillRect/>
+          </a:stretch>
+        </p:blipFill>
+        <p:spPr>
+          <a:xfrm>
+            <a:off x="592876" y="3429000"/>
+            <a:ext cx="3600000" cy="2700000"/>
+          </a:xfrm>
+          <a:prstGeom prst="rect">
+            <a:avLst/>
+          </a:prstGeom>
+        </p:spPr>
+      </p:pic>
+      <p:pic>
+        <p:nvPicPr>
+          <p:cNvPr id="17" name="Picture 16">
+            <a:extLst>
+              <a:ext uri="{FF2B5EF4-FFF2-40B4-BE49-F238E27FC236}">
+                <a16:creationId xmlns:a16="http://schemas.microsoft.com/office/drawing/2014/main" id="{F2CC5256-DD60-463B-944E-43562A8C866E}"/>
+              </a:ext>
+            </a:extLst>
+          </p:cNvPr>
+          <p:cNvPicPr>
+            <a:picLocks noChangeAspect="1"/>
+          </p:cNvPicPr>
+          <p:nvPr/>
+        </p:nvPicPr>
+        <p:blipFill>
+          <a:blip r:embed="rId6">
+            <a:extLst>
+              <a:ext uri="{28A0092B-C50C-407E-A947-70E740481C1C}">
+                <a14:useLocalDpi xmlns:a14="http://schemas.microsoft.com/office/drawing/2010/main" val="0"/>
+              </a:ext>
+            </a:extLst>
+          </a:blip>
+          <a:stretch>
+            <a:fillRect/>
+          </a:stretch>
+        </p:blipFill>
+        <p:spPr>
+          <a:xfrm>
+            <a:off x="4359807" y="3429000"/>
+            <a:ext cx="3600000" cy="2700000"/>
+          </a:xfrm>
+          <a:prstGeom prst="rect">
+            <a:avLst/>
+          </a:prstGeom>
+        </p:spPr>
+      </p:pic>
+      <p:pic>
+        <p:nvPicPr>
+          <p:cNvPr id="19" name="Picture 18">
+            <a:extLst>
+              <a:ext uri="{FF2B5EF4-FFF2-40B4-BE49-F238E27FC236}">
+                <a16:creationId xmlns:a16="http://schemas.microsoft.com/office/drawing/2014/main" id="{A642E76B-4B84-4C91-89D1-EBF0573B8170}"/>
+              </a:ext>
+            </a:extLst>
+          </p:cNvPr>
+          <p:cNvPicPr>
+            <a:picLocks noChangeAspect="1"/>
+          </p:cNvPicPr>
+          <p:nvPr/>
+        </p:nvPicPr>
+        <p:blipFill>
+          <a:blip r:embed="rId7">
+            <a:extLst>
+              <a:ext uri="{28A0092B-C50C-407E-A947-70E740481C1C}">
+                <a14:useLocalDpi xmlns:a14="http://schemas.microsoft.com/office/drawing/2010/main" val="0"/>
+              </a:ext>
+            </a:extLst>
+          </a:blip>
+          <a:stretch>
+            <a:fillRect/>
+          </a:stretch>
+        </p:blipFill>
+        <p:spPr>
+          <a:xfrm>
+            <a:off x="8126738" y="3429000"/>
+            <a:ext cx="3600000" cy="2700000"/>
           </a:xfrm>
           <a:prstGeom prst="rect">
             <a:avLst/>
@@ -20427,10 +20557,10 @@
       </p:pic>
       <p:sp>
         <p:nvSpPr>
-          <p:cNvPr id="7" name="TextBox 6">
+          <p:cNvPr id="20" name="TextBox 19">
             <a:extLst>
               <a:ext uri="{FF2B5EF4-FFF2-40B4-BE49-F238E27FC236}">
-                <a16:creationId xmlns:a16="http://schemas.microsoft.com/office/drawing/2014/main" id="{CA2543CA-DC5C-450E-94D9-0E2FA87AA9C7}"/>
+                <a16:creationId xmlns:a16="http://schemas.microsoft.com/office/drawing/2014/main" id="{151017E4-8A6A-413C-96B2-454772BEE4EF}"/>
               </a:ext>
             </a:extLst>
           </p:cNvPr>
@@ -20439,8 +20569,8 @@
         </p:nvSpPr>
         <p:spPr>
           <a:xfrm>
-            <a:off x="2413561" y="1155975"/>
-            <a:ext cx="1916550" cy="369332"/>
+            <a:off x="1874944" y="6322742"/>
+            <a:ext cx="1035861" cy="369332"/>
           </a:xfrm>
           <a:prstGeom prst="rect">
             <a:avLst/>
@@ -20455,17 +20585,17 @@
           <a:p>
             <a:r>
               <a:rPr lang="en-US" dirty="0"/>
-              <a:t>Shifting spike train</a:t>
+              <a:t>#bins=20</a:t>
             </a:r>
           </a:p>
         </p:txBody>
       </p:sp>
       <p:sp>
         <p:nvSpPr>
-          <p:cNvPr id="8" name="TextBox 7">
+          <p:cNvPr id="21" name="TextBox 20">
             <a:extLst>
               <a:ext uri="{FF2B5EF4-FFF2-40B4-BE49-F238E27FC236}">
-                <a16:creationId xmlns:a16="http://schemas.microsoft.com/office/drawing/2014/main" id="{F768F0BC-60BB-4034-B131-0410B2CFE5CE}"/>
+                <a16:creationId xmlns:a16="http://schemas.microsoft.com/office/drawing/2014/main" id="{399A546C-340D-4509-9147-2C164113EDFC}"/>
               </a:ext>
             </a:extLst>
           </p:cNvPr>
@@ -20474,8 +20604,8 @@
         </p:nvSpPr>
         <p:spPr>
           <a:xfrm>
-            <a:off x="8061344" y="1155975"/>
-            <a:ext cx="1638269" cy="369332"/>
+            <a:off x="5641875" y="6322742"/>
+            <a:ext cx="1035861" cy="369332"/>
           </a:xfrm>
           <a:prstGeom prst="rect">
             <a:avLst/>
@@ -20490,15 +20620,204 @@
           <a:p>
             <a:r>
               <a:rPr lang="en-US" dirty="0"/>
-              <a:t>Shifting current</a:t>
+              <a:t>#bins=30</a:t>
             </a:r>
+          </a:p>
+        </p:txBody>
+      </p:sp>
+      <p:sp>
+        <p:nvSpPr>
+          <p:cNvPr id="22" name="TextBox 21">
+            <a:extLst>
+              <a:ext uri="{FF2B5EF4-FFF2-40B4-BE49-F238E27FC236}">
+                <a16:creationId xmlns:a16="http://schemas.microsoft.com/office/drawing/2014/main" id="{81C52E77-EF39-4C70-AB52-19B9E28BCB94}"/>
+              </a:ext>
+            </a:extLst>
+          </p:cNvPr>
+          <p:cNvSpPr txBox="1"/>
+          <p:nvPr/>
+        </p:nvSpPr>
+        <p:spPr>
+          <a:xfrm>
+            <a:off x="9408805" y="6306687"/>
+            <a:ext cx="1035861" cy="369332"/>
+          </a:xfrm>
+          <a:prstGeom prst="rect">
+            <a:avLst/>
+          </a:prstGeom>
+          <a:noFill/>
+        </p:spPr>
+        <p:txBody>
+          <a:bodyPr wrap="none" rtlCol="0">
+            <a:spAutoFit/>
+          </a:bodyPr>
+          <a:lstStyle/>
+          <a:p>
+            <a:r>
+              <a:rPr lang="en-US" dirty="0"/>
+              <a:t>#bins=40</a:t>
+            </a:r>
+          </a:p>
+        </p:txBody>
+      </p:sp>
+      <p:sp>
+        <p:nvSpPr>
+          <p:cNvPr id="23" name="TextBox 22">
+            <a:extLst>
+              <a:ext uri="{FF2B5EF4-FFF2-40B4-BE49-F238E27FC236}">
+                <a16:creationId xmlns:a16="http://schemas.microsoft.com/office/drawing/2014/main" id="{C352C76B-7B2D-485D-817B-1F94EB7EF8E1}"/>
+              </a:ext>
+            </a:extLst>
+          </p:cNvPr>
+          <p:cNvSpPr txBox="1"/>
+          <p:nvPr/>
+        </p:nvSpPr>
+        <p:spPr>
+          <a:xfrm>
+            <a:off x="215339" y="2803756"/>
+            <a:ext cx="1306580" cy="646331"/>
+          </a:xfrm>
+          <a:prstGeom prst="rect">
+            <a:avLst/>
+          </a:prstGeom>
+          <a:noFill/>
+        </p:spPr>
+        <p:txBody>
+          <a:bodyPr wrap="square" rtlCol="0">
+            <a:spAutoFit/>
+          </a:bodyPr>
+          <a:lstStyle/>
+          <a:p>
+            <a:r>
+              <a:rPr lang="en-US" dirty="0"/>
+              <a:t>Length of time series </a:t>
+            </a:r>
+          </a:p>
+        </p:txBody>
+      </p:sp>
+      <p:sp>
+        <p:nvSpPr>
+          <p:cNvPr id="24" name="TextBox 23">
+            <a:extLst>
+              <a:ext uri="{FF2B5EF4-FFF2-40B4-BE49-F238E27FC236}">
+                <a16:creationId xmlns:a16="http://schemas.microsoft.com/office/drawing/2014/main" id="{319A3127-0CF7-49C6-B973-02B7E0B022B1}"/>
+              </a:ext>
+            </a:extLst>
+          </p:cNvPr>
+          <p:cNvSpPr txBox="1"/>
+          <p:nvPr/>
+        </p:nvSpPr>
+        <p:spPr>
+          <a:xfrm>
+            <a:off x="5677478" y="2939739"/>
+            <a:ext cx="849913" cy="369332"/>
+          </a:xfrm>
+          <a:prstGeom prst="rect">
+            <a:avLst/>
+          </a:prstGeom>
+          <a:noFill/>
+        </p:spPr>
+        <p:txBody>
+          <a:bodyPr wrap="none" rtlCol="0">
+            <a:spAutoFit/>
+          </a:bodyPr>
+          <a:lstStyle/>
+          <a:p>
+            <a:r>
+              <a:rPr lang="en-US" dirty="0"/>
+              <a:t>10k </a:t>
+            </a:r>
+            <a:r>
+              <a:rPr lang="en-US" dirty="0" err="1"/>
+              <a:t>ms</a:t>
+            </a:r>
+            <a:endParaRPr lang="en-US" dirty="0"/>
+          </a:p>
+        </p:txBody>
+      </p:sp>
+      <p:sp>
+        <p:nvSpPr>
+          <p:cNvPr id="25" name="TextBox 24">
+            <a:extLst>
+              <a:ext uri="{FF2B5EF4-FFF2-40B4-BE49-F238E27FC236}">
+                <a16:creationId xmlns:a16="http://schemas.microsoft.com/office/drawing/2014/main" id="{EC97BF34-5B01-4FB6-BB02-34315370A2D9}"/>
+              </a:ext>
+            </a:extLst>
+          </p:cNvPr>
+          <p:cNvSpPr txBox="1"/>
+          <p:nvPr/>
+        </p:nvSpPr>
+        <p:spPr>
+          <a:xfrm>
+            <a:off x="9444408" y="2923684"/>
+            <a:ext cx="966931" cy="369332"/>
+          </a:xfrm>
+          <a:prstGeom prst="rect">
+            <a:avLst/>
+          </a:prstGeom>
+          <a:noFill/>
+        </p:spPr>
+        <p:txBody>
+          <a:bodyPr wrap="none" rtlCol="0">
+            <a:spAutoFit/>
+          </a:bodyPr>
+          <a:lstStyle/>
+          <a:p>
+            <a:r>
+              <a:rPr lang="en-US" dirty="0"/>
+              <a:t>100k </a:t>
+            </a:r>
+            <a:r>
+              <a:rPr lang="en-US" dirty="0" err="1"/>
+              <a:t>ms</a:t>
+            </a:r>
+            <a:endParaRPr lang="en-US" dirty="0"/>
+          </a:p>
+        </p:txBody>
+      </p:sp>
+      <p:sp>
+        <p:nvSpPr>
+          <p:cNvPr id="26" name="Rectangle 25">
+            <a:extLst>
+              <a:ext uri="{FF2B5EF4-FFF2-40B4-BE49-F238E27FC236}">
+                <a16:creationId xmlns:a16="http://schemas.microsoft.com/office/drawing/2014/main" id="{D82E5EEA-EEE5-4CCC-AE7C-547B5AA2EC53}"/>
+              </a:ext>
+            </a:extLst>
+          </p:cNvPr>
+          <p:cNvSpPr/>
+          <p:nvPr/>
+        </p:nvSpPr>
+        <p:spPr>
+          <a:xfrm>
+            <a:off x="2026052" y="2923684"/>
+            <a:ext cx="732893" cy="369332"/>
+          </a:xfrm>
+          <a:prstGeom prst="rect">
+            <a:avLst/>
+          </a:prstGeom>
+        </p:spPr>
+        <p:txBody>
+          <a:bodyPr wrap="none">
+            <a:spAutoFit/>
+          </a:bodyPr>
+          <a:lstStyle/>
+          <a:p>
+            <a:r>
+              <a:rPr lang="en-US" dirty="0"/>
+              <a:t>1k </a:t>
+            </a:r>
+            <a:r>
+              <a:rPr lang="en-US" dirty="0" err="1"/>
+              <a:t>ms</a:t>
+            </a:r>
+            <a:endParaRPr lang="en-US" dirty="0"/>
           </a:p>
         </p:txBody>
       </p:sp>
     </p:spTree>
     <p:extLst>
       <p:ext uri="{BB962C8B-B14F-4D97-AF65-F5344CB8AC3E}">
-        <p14:creationId xmlns:p14="http://schemas.microsoft.com/office/powerpoint/2010/main" val="3026322813"/>
+        <p14:creationId xmlns:p14="http://schemas.microsoft.com/office/powerpoint/2010/main" val="1483401223"/>
       </p:ext>
     </p:extLst>
   </p:cSld>
@@ -21071,6 +21390,180 @@
     <p:extLst>
       <p:ext uri="{BB962C8B-B14F-4D97-AF65-F5344CB8AC3E}">
         <p14:creationId xmlns:p14="http://schemas.microsoft.com/office/powerpoint/2010/main" val="915128517"/>
+      </p:ext>
+    </p:extLst>
+  </p:cSld>
+  <p:clrMapOvr>
+    <a:masterClrMapping/>
+  </p:clrMapOvr>
+</p:sld>
+</file>
+
+<file path=ppt/slides/slide20.xml><?xml version="1.0" encoding="utf-8"?>
+<p:sld xmlns:a="http://schemas.openxmlformats.org/drawingml/2006/main" xmlns:r="http://schemas.openxmlformats.org/officeDocument/2006/relationships" xmlns:p="http://schemas.openxmlformats.org/presentationml/2006/main" show="0">
+  <p:cSld>
+    <p:spTree>
+      <p:nvGrpSpPr>
+        <p:cNvPr id="1" name=""/>
+        <p:cNvGrpSpPr/>
+        <p:nvPr/>
+      </p:nvGrpSpPr>
+      <p:grpSpPr>
+        <a:xfrm>
+          <a:off x="0" y="0"/>
+          <a:ext cx="0" cy="0"/>
+          <a:chOff x="0" y="0"/>
+          <a:chExt cx="0" cy="0"/>
+        </a:xfrm>
+      </p:grpSpPr>
+      <p:pic>
+        <p:nvPicPr>
+          <p:cNvPr id="4" name="Picture 3">
+            <a:hlinkClick r:id="rId2" action="ppaction://hlinksldjump"/>
+            <a:extLst>
+              <a:ext uri="{FF2B5EF4-FFF2-40B4-BE49-F238E27FC236}">
+                <a16:creationId xmlns:a16="http://schemas.microsoft.com/office/drawing/2014/main" id="{EDF5E059-7578-480C-939A-57A363442EE9}"/>
+              </a:ext>
+            </a:extLst>
+          </p:cNvPr>
+          <p:cNvPicPr>
+            <a:picLocks noChangeAspect="1"/>
+          </p:cNvPicPr>
+          <p:nvPr/>
+        </p:nvPicPr>
+        <p:blipFill>
+          <a:blip r:embed="rId3">
+            <a:extLst>
+              <a:ext uri="{28A0092B-C50C-407E-A947-70E740481C1C}">
+                <a14:useLocalDpi xmlns:a14="http://schemas.microsoft.com/office/drawing/2010/main" val="0"/>
+              </a:ext>
+            </a:extLst>
+          </a:blip>
+          <a:stretch>
+            <a:fillRect/>
+          </a:stretch>
+        </p:blipFill>
+        <p:spPr>
+          <a:xfrm>
+            <a:off x="527043" y="1340641"/>
+            <a:ext cx="5568957" cy="4176718"/>
+          </a:xfrm>
+          <a:prstGeom prst="rect">
+            <a:avLst/>
+          </a:prstGeom>
+        </p:spPr>
+      </p:pic>
+      <p:pic>
+        <p:nvPicPr>
+          <p:cNvPr id="6" name="Picture 5">
+            <a:hlinkClick r:id="rId2" action="ppaction://hlinksldjump"/>
+            <a:extLst>
+              <a:ext uri="{FF2B5EF4-FFF2-40B4-BE49-F238E27FC236}">
+                <a16:creationId xmlns:a16="http://schemas.microsoft.com/office/drawing/2014/main" id="{48C9FC82-070C-477E-B4CD-74E3064ACB75}"/>
+              </a:ext>
+            </a:extLst>
+          </p:cNvPr>
+          <p:cNvPicPr>
+            <a:picLocks noChangeAspect="1"/>
+          </p:cNvPicPr>
+          <p:nvPr/>
+        </p:nvPicPr>
+        <p:blipFill>
+          <a:blip r:embed="rId4">
+            <a:extLst>
+              <a:ext uri="{28A0092B-C50C-407E-A947-70E740481C1C}">
+                <a14:useLocalDpi xmlns:a14="http://schemas.microsoft.com/office/drawing/2010/main" val="0"/>
+              </a:ext>
+            </a:extLst>
+          </a:blip>
+          <a:stretch>
+            <a:fillRect/>
+          </a:stretch>
+        </p:blipFill>
+        <p:spPr>
+          <a:xfrm>
+            <a:off x="6096000" y="1340641"/>
+            <a:ext cx="5568957" cy="4176718"/>
+          </a:xfrm>
+          <a:prstGeom prst="rect">
+            <a:avLst/>
+          </a:prstGeom>
+        </p:spPr>
+      </p:pic>
+      <p:sp>
+        <p:nvSpPr>
+          <p:cNvPr id="7" name="TextBox 6">
+            <a:extLst>
+              <a:ext uri="{FF2B5EF4-FFF2-40B4-BE49-F238E27FC236}">
+                <a16:creationId xmlns:a16="http://schemas.microsoft.com/office/drawing/2014/main" id="{CA2543CA-DC5C-450E-94D9-0E2FA87AA9C7}"/>
+              </a:ext>
+            </a:extLst>
+          </p:cNvPr>
+          <p:cNvSpPr txBox="1"/>
+          <p:nvPr/>
+        </p:nvSpPr>
+        <p:spPr>
+          <a:xfrm>
+            <a:off x="2413561" y="1155975"/>
+            <a:ext cx="1916550" cy="369332"/>
+          </a:xfrm>
+          <a:prstGeom prst="rect">
+            <a:avLst/>
+          </a:prstGeom>
+          <a:noFill/>
+        </p:spPr>
+        <p:txBody>
+          <a:bodyPr wrap="none" rtlCol="0">
+            <a:spAutoFit/>
+          </a:bodyPr>
+          <a:lstStyle/>
+          <a:p>
+            <a:r>
+              <a:rPr lang="en-US" dirty="0"/>
+              <a:t>Shifting spike train</a:t>
+            </a:r>
+          </a:p>
+        </p:txBody>
+      </p:sp>
+      <p:sp>
+        <p:nvSpPr>
+          <p:cNvPr id="8" name="TextBox 7">
+            <a:extLst>
+              <a:ext uri="{FF2B5EF4-FFF2-40B4-BE49-F238E27FC236}">
+                <a16:creationId xmlns:a16="http://schemas.microsoft.com/office/drawing/2014/main" id="{F768F0BC-60BB-4034-B131-0410B2CFE5CE}"/>
+              </a:ext>
+            </a:extLst>
+          </p:cNvPr>
+          <p:cNvSpPr txBox="1"/>
+          <p:nvPr/>
+        </p:nvSpPr>
+        <p:spPr>
+          <a:xfrm>
+            <a:off x="8061344" y="1155975"/>
+            <a:ext cx="1638269" cy="369332"/>
+          </a:xfrm>
+          <a:prstGeom prst="rect">
+            <a:avLst/>
+          </a:prstGeom>
+          <a:noFill/>
+        </p:spPr>
+        <p:txBody>
+          <a:bodyPr wrap="none" rtlCol="0">
+            <a:spAutoFit/>
+          </a:bodyPr>
+          <a:lstStyle/>
+          <a:p>
+            <a:r>
+              <a:rPr lang="en-US" dirty="0"/>
+              <a:t>Shifting current</a:t>
+            </a:r>
+          </a:p>
+        </p:txBody>
+      </p:sp>
+    </p:spTree>
+    <p:extLst>
+      <p:ext uri="{BB962C8B-B14F-4D97-AF65-F5344CB8AC3E}">
+        <p14:creationId xmlns:p14="http://schemas.microsoft.com/office/powerpoint/2010/main" val="3026322813"/>
       </p:ext>
     </p:extLst>
   </p:cSld>

</xml_diff>